<commit_message>
Kernel 3.3: Kernel matrix is calculated correctly - bus slowly.
</commit_message>
<xml_diff>
--- a/exercises/exercise3/Jens/Ergebnisse_Uebung3.pptx
+++ b/exercises/exercise3/Jens/Ergebnisse_Uebung3.pptx
@@ -6931,7 +6931,7 @@
         </p:nvSpPr>
         <p:spPr>
           <a:xfrm>
-            <a:off x="5940152" y="1844824"/>
+            <a:off x="5940152" y="1556792"/>
             <a:ext cx="2741904" cy="369332"/>
           </a:xfrm>
           <a:prstGeom prst="rect">
@@ -6973,6 +6973,135 @@
           </a:p>
         </p:txBody>
       </p:sp>
+      <p:sp>
+        <p:nvSpPr>
+          <p:cNvPr id="39" name="Textfeld 38"/>
+          <p:cNvSpPr txBox="1"/>
+          <p:nvPr/>
+        </p:nvSpPr>
+        <p:spPr>
+          <a:xfrm>
+            <a:off x="467544" y="2780928"/>
+            <a:ext cx="1638462" cy="646331"/>
+          </a:xfrm>
+          <a:prstGeom prst="rect">
+            <a:avLst/>
+          </a:prstGeom>
+          <a:noFill/>
+        </p:spPr>
+        <p:txBody>
+          <a:bodyPr wrap="none" rtlCol="0">
+            <a:spAutoFit/>
+          </a:bodyPr>
+          <a:lstStyle/>
+          <a:p>
+            <a:pPr>
+              <a:buFontTx/>
+              <a:buChar char="-"/>
+            </a:pPr>
+            <a:r>
+              <a:rPr lang="de-DE" b="1" dirty="0" err="1" smtClean="0"/>
+              <a:t>two</a:t>
+            </a:r>
+            <a:r>
+              <a:rPr lang="de-DE" b="1" dirty="0" smtClean="0"/>
+              <a:t> </a:t>
+            </a:r>
+            <a:r>
+              <a:rPr lang="de-DE" b="1" dirty="0" err="1" smtClean="0"/>
+              <a:t>groups</a:t>
+            </a:r>
+            <a:endParaRPr lang="de-DE" b="1" dirty="0" smtClean="0"/>
+          </a:p>
+          <a:p>
+            <a:r>
+              <a:rPr lang="de-DE" b="1" dirty="0" err="1" smtClean="0"/>
+              <a:t>of</a:t>
+            </a:r>
+            <a:r>
+              <a:rPr lang="de-DE" b="1" dirty="0" smtClean="0"/>
+              <a:t> </a:t>
+            </a:r>
+            <a:r>
+              <a:rPr lang="de-DE" b="1" dirty="0" err="1" smtClean="0"/>
+              <a:t>eigenvectors</a:t>
+            </a:r>
+            <a:endParaRPr lang="de-DE" b="1" dirty="0" smtClean="0"/>
+          </a:p>
+        </p:txBody>
+      </p:sp>
+      <p:cxnSp>
+        <p:nvCxnSpPr>
+          <p:cNvPr id="40" name="Gerade Verbindung mit Pfeil 39"/>
+          <p:cNvCxnSpPr/>
+          <p:nvPr/>
+        </p:nvCxnSpPr>
+        <p:spPr>
+          <a:xfrm flipV="1">
+            <a:off x="2051720" y="2852936"/>
+            <a:ext cx="2304256" cy="144016"/>
+          </a:xfrm>
+          <a:prstGeom prst="straightConnector1">
+            <a:avLst/>
+          </a:prstGeom>
+          <a:ln w="38100">
+            <a:solidFill>
+              <a:schemeClr val="tx1"/>
+            </a:solidFill>
+            <a:tailEnd type="arrow"/>
+          </a:ln>
+        </p:spPr>
+        <p:style>
+          <a:lnRef idx="1">
+            <a:schemeClr val="accent1"/>
+          </a:lnRef>
+          <a:fillRef idx="0">
+            <a:schemeClr val="accent1"/>
+          </a:fillRef>
+          <a:effectRef idx="0">
+            <a:schemeClr val="accent1"/>
+          </a:effectRef>
+          <a:fontRef idx="minor">
+            <a:schemeClr val="tx1"/>
+          </a:fontRef>
+        </p:style>
+      </p:cxnSp>
+      <p:cxnSp>
+        <p:nvCxnSpPr>
+          <p:cNvPr id="43" name="Gerade Verbindung mit Pfeil 42"/>
+          <p:cNvCxnSpPr/>
+          <p:nvPr/>
+        </p:nvCxnSpPr>
+        <p:spPr>
+          <a:xfrm>
+            <a:off x="1835696" y="3429000"/>
+            <a:ext cx="864096" cy="432048"/>
+          </a:xfrm>
+          <a:prstGeom prst="straightConnector1">
+            <a:avLst/>
+          </a:prstGeom>
+          <a:ln w="38100">
+            <a:solidFill>
+              <a:schemeClr val="tx1"/>
+            </a:solidFill>
+            <a:tailEnd type="arrow"/>
+          </a:ln>
+        </p:spPr>
+        <p:style>
+          <a:lnRef idx="1">
+            <a:schemeClr val="accent1"/>
+          </a:lnRef>
+          <a:fillRef idx="0">
+            <a:schemeClr val="accent1"/>
+          </a:fillRef>
+          <a:effectRef idx="0">
+            <a:schemeClr val="accent1"/>
+          </a:effectRef>
+          <a:fontRef idx="minor">
+            <a:schemeClr val="tx1"/>
+          </a:fontRef>
+        </p:style>
+      </p:cxnSp>
     </p:spTree>
   </p:cSld>
   <p:clrMapOvr>
@@ -7139,7 +7268,7 @@
         </p:nvSpPr>
         <p:spPr>
           <a:xfrm>
-            <a:off x="395536" y="2060848"/>
+            <a:off x="251520" y="6165304"/>
             <a:ext cx="1300356" cy="369332"/>
           </a:xfrm>
           <a:prstGeom prst="rect">
@@ -7176,9 +7305,9 @@
           <p:nvPr/>
         </p:nvCxnSpPr>
         <p:spPr>
-          <a:xfrm>
-            <a:off x="1403648" y="2420888"/>
-            <a:ext cx="144016" cy="936104"/>
+          <a:xfrm flipV="1">
+            <a:off x="1331640" y="5229200"/>
+            <a:ext cx="360040" cy="864096"/>
           </a:xfrm>
           <a:prstGeom prst="straightConnector1">
             <a:avLst/>
@@ -7214,7 +7343,7 @@
         <p:spPr>
           <a:xfrm>
             <a:off x="5652120" y="908720"/>
-            <a:ext cx="2650021" cy="646331"/>
+            <a:ext cx="2650021" cy="923330"/>
           </a:xfrm>
           <a:prstGeom prst="rect">
             <a:avLst/>
@@ -7265,6 +7394,21 @@
             <a:r>
               <a:rPr lang="de-DE" b="1" dirty="0" err="1" smtClean="0"/>
               <a:t>behavior</a:t>
+            </a:r>
+            <a:endParaRPr lang="de-DE" b="1" dirty="0" smtClean="0"/>
+          </a:p>
+          <a:p>
+            <a:r>
+              <a:rPr lang="de-DE" b="1" dirty="0" smtClean="0"/>
+              <a:t>(2 </a:t>
+            </a:r>
+            <a:r>
+              <a:rPr lang="de-DE" b="1" dirty="0" err="1" smtClean="0"/>
+              <a:t>groups</a:t>
+            </a:r>
+            <a:r>
+              <a:rPr lang="de-DE" b="1" dirty="0" smtClean="0"/>
+              <a:t>)</a:t>
             </a:r>
             <a:endParaRPr lang="de-DE" b="1" dirty="0" smtClean="0"/>
           </a:p>
@@ -7488,7 +7632,43 @@
           <a:p>
             <a:r>
               <a:rPr lang="de-DE" b="1" dirty="0" err="1" smtClean="0"/>
-              <a:t>behaviour</a:t>
+              <a:t>Behaviour</a:t>
+            </a:r>
+            <a:r>
+              <a:rPr lang="de-DE" b="1" dirty="0" smtClean="0"/>
+              <a:t> (</a:t>
+            </a:r>
+            <a:r>
+              <a:rPr lang="de-DE" b="1" dirty="0" err="1" smtClean="0"/>
+              <a:t>here</a:t>
+            </a:r>
+            <a:r>
+              <a:rPr lang="de-DE" b="1" dirty="0" smtClean="0"/>
+              <a:t>: </a:t>
+            </a:r>
+            <a:r>
+              <a:rPr lang="de-DE" b="1" dirty="0" err="1" smtClean="0"/>
+              <a:t>the</a:t>
+            </a:r>
+            <a:r>
+              <a:rPr lang="de-DE" b="1" dirty="0" smtClean="0"/>
+              <a:t> </a:t>
+            </a:r>
+            <a:r>
+              <a:rPr lang="de-DE" b="1" dirty="0" err="1" smtClean="0"/>
+              <a:t>purple</a:t>
+            </a:r>
+            <a:r>
+              <a:rPr lang="de-DE" b="1" dirty="0" smtClean="0"/>
+              <a:t> </a:t>
+            </a:r>
+            <a:r>
+              <a:rPr lang="de-DE" b="1" dirty="0" err="1" smtClean="0"/>
+              <a:t>one</a:t>
+            </a:r>
+            <a:r>
+              <a:rPr lang="de-DE" b="1" dirty="0" smtClean="0"/>
+              <a:t>)</a:t>
             </a:r>
             <a:endParaRPr lang="de-DE" b="1" dirty="0" smtClean="0"/>
           </a:p>

</xml_diff>